<commit_message>
toc for second half
</commit_message>
<xml_diff>
--- a/doc/meetings/ldk-2021/2.b-ld4lt-summary.pptx
+++ b/doc/meetings/ldk-2021/2.b-ld4lt-summary.pptx
@@ -246,7 +246,7 @@
             <a:fld id="{C2F2E05C-DC70-4FFA-82FC-2DC031184B82}" type="datetimeFigureOut">
               <a:rPr lang="de-DE" smtClean="0"/>
               <a:pPr/>
-              <a:t>31.08.2021</a:t>
+              <a:t>01.09.2021</a:t>
             </a:fld>
             <a:endParaRPr lang="de-DE"/>
           </a:p>
@@ -4431,8 +4431,8 @@
           </a:p>
         </p:txBody>
       </p:sp>
-      <mc:AlternateContent xmlns:mc="http://schemas.openxmlformats.org/markup-compatibility/2006">
-        <mc:Choice xmlns:a14="http://schemas.microsoft.com/office/drawing/2010/main" Requires="a14">
+      <mc:AlternateContent xmlns:mc="http://schemas.openxmlformats.org/markup-compatibility/2006" xmlns:a14="http://schemas.microsoft.com/office/drawing/2010/main">
+        <mc:Choice Requires="a14">
           <p:sp>
             <p:nvSpPr>
               <p:cNvPr id="3" name="Content Placeholder 2"/>
@@ -4587,7 +4587,7 @@
             </p:txBody>
           </p:sp>
         </mc:Choice>
-        <mc:Fallback>
+        <mc:Fallback xmlns="">
           <p:sp>
             <p:nvSpPr>
               <p:cNvPr id="3" name="Content Placeholder 2"/>
@@ -5087,7 +5087,6 @@
               <a:rPr lang="de-DE" sz="2400" dirty="0" smtClean="0"/>
               <a:t>2018-2019</a:t>
             </a:r>
-            <a:endParaRPr lang="de-DE" sz="2400" dirty="0" smtClean="0"/>
           </a:p>
           <a:p>
             <a:pPr lvl="1"/>
@@ -5139,7 +5138,6 @@
               <a:rPr lang="de-DE" sz="2400" dirty="0" smtClean="0"/>
               <a:t>joint activity with Cost Action Nexus Linguarum (2019-2023)</a:t>
             </a:r>
-            <a:endParaRPr lang="de-DE" sz="2400" dirty="0" smtClean="0"/>
           </a:p>
         </p:txBody>
       </p:sp>
@@ -5250,15 +5248,7 @@
           <a:p>
             <a:r>
               <a:rPr lang="de-DE" dirty="0" smtClean="0"/>
-              <a:t>Survey </a:t>
-            </a:r>
-            <a:r>
-              <a:rPr lang="de-DE" dirty="0" smtClean="0"/>
-              <a:t>of requirements and </a:t>
-            </a:r>
-            <a:r>
-              <a:rPr lang="de-DE" dirty="0" smtClean="0"/>
-              <a:t>features</a:t>
+              <a:t>Survey of requirements and features</a:t>
             </a:r>
           </a:p>
           <a:p>
@@ -5281,7 +5271,6 @@
               <a:rPr lang="de-DE" sz="1600" dirty="0" smtClean="0"/>
               <a:t> </a:t>
             </a:r>
-            <a:endParaRPr lang="de-DE" sz="1600" dirty="0" smtClean="0"/>
           </a:p>
         </p:txBody>
       </p:sp>
@@ -5454,15 +5443,7 @@
           <a:p>
             <a:r>
               <a:rPr lang="de-DE" dirty="0" smtClean="0"/>
-              <a:t>Survey </a:t>
-            </a:r>
-            <a:r>
-              <a:rPr lang="de-DE" dirty="0" smtClean="0"/>
-              <a:t>of requirements and </a:t>
-            </a:r>
-            <a:r>
-              <a:rPr lang="de-DE" dirty="0" smtClean="0"/>
-              <a:t>features</a:t>
+              <a:t>Survey of requirements and features</a:t>
             </a:r>
           </a:p>
           <a:p>
@@ -5526,7 +5507,6 @@
               <a:rPr lang="de-DE" dirty="0" smtClean="0"/>
               <a:t>Khan et al. (ms), TITLE</a:t>
             </a:r>
-            <a:endParaRPr lang="de-DE" dirty="0" smtClean="0"/>
           </a:p>
         </p:txBody>
       </p:sp>
@@ -5637,25 +5617,13 @@
           <a:p>
             <a:r>
               <a:rPr lang="de-DE" dirty="0" smtClean="0"/>
-              <a:t>Survey </a:t>
-            </a:r>
-            <a:r>
-              <a:rPr lang="de-DE" dirty="0" smtClean="0"/>
-              <a:t>of requirements and features</a:t>
-            </a:r>
-          </a:p>
-          <a:p>
-            <a:r>
-              <a:rPr lang="de-DE" dirty="0" smtClean="0"/>
-              <a:t>Now, </a:t>
-            </a:r>
-            <a:r>
-              <a:rPr lang="de-DE" dirty="0" smtClean="0"/>
-              <a:t>decide how to develop common </a:t>
-            </a:r>
-            <a:r>
-              <a:rPr lang="de-DE" dirty="0" smtClean="0"/>
-              <a:t>specifications</a:t>
+              <a:t>Survey of requirements and features</a:t>
+            </a:r>
+          </a:p>
+          <a:p>
+            <a:r>
+              <a:rPr lang="de-DE" dirty="0" smtClean="0"/>
+              <a:t>Now, decide how to develop common specifications</a:t>
             </a:r>
           </a:p>
           <a:p>
@@ -5692,7 +5660,6 @@
               <a:rPr lang="de-DE" dirty="0" smtClean="0"/>
               <a:t>„LAF-RDF“ ?</a:t>
             </a:r>
-            <a:endParaRPr lang="de-DE" dirty="0" smtClean="0"/>
           </a:p>
         </p:txBody>
       </p:sp>
@@ -5803,25 +5770,13 @@
           <a:p>
             <a:r>
               <a:rPr lang="de-DE" dirty="0" smtClean="0"/>
-              <a:t>Survey </a:t>
-            </a:r>
-            <a:r>
-              <a:rPr lang="de-DE" dirty="0" smtClean="0"/>
-              <a:t>of requirements and features</a:t>
-            </a:r>
-          </a:p>
-          <a:p>
-            <a:r>
-              <a:rPr lang="de-DE" dirty="0" smtClean="0"/>
-              <a:t>Now, </a:t>
-            </a:r>
-            <a:r>
-              <a:rPr lang="de-DE" dirty="0" smtClean="0"/>
-              <a:t>decide how to develop common </a:t>
-            </a:r>
-            <a:r>
-              <a:rPr lang="de-DE" dirty="0" smtClean="0"/>
-              <a:t>specifications</a:t>
+              <a:t>Survey of requirements and features</a:t>
+            </a:r>
+          </a:p>
+          <a:p>
+            <a:r>
+              <a:rPr lang="de-DE" dirty="0" smtClean="0"/>
+              <a:t>Now, decide how to develop common specifications</a:t>
             </a:r>
           </a:p>
           <a:p>
@@ -6169,19 +6124,11 @@
             </a:pPr>
             <a:r>
               <a:rPr lang="en-GB" sz="1800" dirty="0"/>
-              <a:t>Web Annotation </a:t>
-            </a:r>
-            <a:r>
-              <a:rPr lang="en-GB" sz="1800" dirty="0"/>
-              <a:t>		</a:t>
+              <a:t>Web Annotation 		</a:t>
             </a:r>
             <a:r>
               <a:rPr lang="en-GB" sz="1600" dirty="0"/>
-              <a:t>(</a:t>
-            </a:r>
-            <a:r>
-              <a:rPr lang="en-GB" sz="1600" dirty="0"/>
-              <a:t>mostly for bioinformatics and DH)</a:t>
+              <a:t>(mostly for bioinformatics and DH)</a:t>
             </a:r>
             <a:endParaRPr sz="1600" dirty="0"/>
           </a:p>
@@ -6191,19 +6138,11 @@
             </a:pPr>
             <a:r>
               <a:rPr lang="en-GB" sz="1800" dirty="0"/>
-              <a:t>NLP Interchange Format </a:t>
-            </a:r>
-            <a:r>
-              <a:rPr lang="en-GB" sz="1800" dirty="0"/>
-              <a:t>	</a:t>
+              <a:t>NLP Interchange Format 	</a:t>
             </a:r>
             <a:r>
               <a:rPr lang="en-GB" sz="1600" dirty="0"/>
-              <a:t>(</a:t>
-            </a:r>
-            <a:r>
-              <a:rPr lang="en-GB" sz="1600" dirty="0"/>
-              <a:t>mostly for NLP web services)</a:t>
+              <a:t>(mostly for NLP web services)</a:t>
             </a:r>
             <a:endParaRPr sz="1600" dirty="0"/>
           </a:p>
@@ -6243,15 +6182,7 @@
             </a:r>
             <a:r>
               <a:rPr lang="en-GB" sz="1600" dirty="0"/>
-              <a:t>generic </a:t>
-            </a:r>
-            <a:r>
-              <a:rPr lang="en-GB" sz="1600" dirty="0"/>
-              <a:t>LAF data </a:t>
-            </a:r>
-            <a:r>
-              <a:rPr lang="en-GB" sz="1600" dirty="0"/>
-              <a:t>structures)</a:t>
+              <a:t>generic LAF data structures)</a:t>
             </a:r>
             <a:endParaRPr sz="1600" dirty="0"/>
           </a:p>
@@ -6261,11 +6192,7 @@
             </a:pPr>
             <a:r>
               <a:rPr lang="en-GB" sz="1800" dirty="0"/>
-              <a:t>Prospects on information integration recognized already during the </a:t>
-            </a:r>
-            <a:r>
-              <a:rPr lang="en-GB" sz="1800" dirty="0"/>
-              <a:t>2000s</a:t>
+              <a:t>Prospects on information integration recognized already during the 2000s</a:t>
             </a:r>
             <a:endParaRPr sz="1800" dirty="0"/>
           </a:p>
@@ -6449,7 +6376,6 @@
               <a:rPr lang="de-DE" dirty="0" smtClean="0"/>
               <a:t> </a:t>
             </a:r>
-            <a:endParaRPr lang="de-DE" dirty="0" smtClean="0"/>
           </a:p>
           <a:p>
             <a:r>
@@ -7234,11 +7160,7 @@
           <a:p>
             <a:r>
               <a:rPr lang="de-DE" dirty="0" smtClean="0"/>
-              <a:t>both supported by Web </a:t>
-            </a:r>
-            <a:r>
-              <a:rPr lang="de-DE" dirty="0" smtClean="0"/>
-              <a:t>Annotation</a:t>
+              <a:t>both supported by Web Annotation</a:t>
             </a:r>
           </a:p>
           <a:p>
@@ -7374,11 +7296,7 @@
             <a:pPr lvl="1"/>
             <a:r>
               <a:rPr lang="de-DE" dirty="0" smtClean="0"/>
-              <a:t>other </a:t>
-            </a:r>
-            <a:r>
-              <a:rPr lang="de-DE" dirty="0" smtClean="0"/>
-              <a:t>RDF vocabularies include</a:t>
+              <a:t>other RDF vocabularies include</a:t>
             </a:r>
           </a:p>
           <a:p>
@@ -7399,11 +7317,7 @@
             <a:pPr lvl="2"/>
             <a:r>
               <a:rPr lang="de-DE" dirty="0" smtClean="0"/>
-              <a:t>LAF/POWLA </a:t>
-            </a:r>
-            <a:r>
-              <a:rPr lang="de-DE" dirty="0" smtClean="0"/>
-              <a:t>(generic format[s], but limited tool support)</a:t>
+              <a:t>LAF/POWLA (generic format[s], but limited tool support)</a:t>
             </a:r>
           </a:p>
           <a:p>
@@ -7526,11 +7440,7 @@
           <a:p>
             <a:r>
               <a:rPr lang="de-DE" dirty="0" smtClean="0"/>
-              <a:t>Independent </a:t>
-            </a:r>
-            <a:r>
-              <a:rPr lang="de-DE" dirty="0" smtClean="0"/>
-              <a:t>API specifications</a:t>
+              <a:t>Independent API specifications</a:t>
             </a:r>
           </a:p>
           <a:p>

</xml_diff>